<commit_message>
update end school -done function
</commit_message>
<xml_diff>
--- a/ppt/프레젠테이션1.pptx
+++ b/ppt/프레젠테이션1.pptx
@@ -9,6 +9,7 @@
     <p:sldId id="259" r:id="rId3"/>
     <p:sldId id="256" r:id="rId4"/>
     <p:sldId id="257" r:id="rId5"/>
+    <p:sldId id="260" r:id="rId6"/>
   </p:sldIdLst>
   <p:sldSz cx="9144000" cy="6858000" type="screen4x3"/>
   <p:notesSz cx="6858000" cy="9144000"/>
@@ -3609,13 +3610,6 @@
               </a:rPr>
               <a:t>Table of Contents</a:t>
             </a:r>
-            <a:endParaRPr lang="en-US" altLang="ko-KR" sz="1400" dirty="0" smtClean="0">
-              <a:solidFill>
-                <a:schemeClr val="bg1">
-                  <a:alpha val="45000"/>
-                </a:schemeClr>
-              </a:solidFill>
-            </a:endParaRPr>
           </a:p>
         </p:txBody>
       </p:sp>
@@ -3675,14 +3669,14 @@
               <a:buChar char="v"/>
             </a:pPr>
             <a:r>
-              <a:rPr lang="ko-KR" altLang="en-US" sz="4000" dirty="0" smtClean="0">
+              <a:rPr lang="ko-KR" altLang="en-US" sz="4000" dirty="0" err="1" smtClean="0">
                 <a:solidFill>
                   <a:schemeClr val="bg1"/>
                 </a:solidFill>
                 <a:latin typeface="나눔명조" pitchFamily="18" charset="-127"/>
                 <a:ea typeface="나눔명조" pitchFamily="18" charset="-127"/>
               </a:rPr>
-              <a:t>필요성</a:t>
+              <a:t>앱필요성</a:t>
             </a:r>
             <a:endParaRPr lang="en-US" altLang="ko-KR" sz="4000" dirty="0" smtClean="0">
               <a:solidFill>
@@ -4106,25 +4100,8 @@
                   </a:schemeClr>
                 </a:solidFill>
               </a:rPr>
-              <a:t>Development </a:t>
-            </a:r>
-            <a:r>
-              <a:rPr lang="en-US" altLang="ko-KR" sz="1400" dirty="0" smtClean="0">
-                <a:solidFill>
-                  <a:schemeClr val="bg1">
-                    <a:alpha val="45000"/>
-                  </a:schemeClr>
-                </a:solidFill>
-              </a:rPr>
-              <a:t>Motive</a:t>
-            </a:r>
-            <a:endParaRPr lang="en-US" altLang="ko-KR" sz="1400" dirty="0" smtClean="0">
-              <a:solidFill>
-                <a:schemeClr val="bg1">
-                  <a:alpha val="45000"/>
-                </a:schemeClr>
-              </a:solidFill>
-            </a:endParaRPr>
+              <a:t>Development Motive</a:t>
+            </a:r>
           </a:p>
         </p:txBody>
       </p:sp>
@@ -4316,6 +4293,36 @@
     <p:extLst>
       <p:ext uri="{BB962C8B-B14F-4D97-AF65-F5344CB8AC3E}">
         <p14:creationId xmlns:p14="http://schemas.microsoft.com/office/powerpoint/2010/main" val="1663952362"/>
+      </p:ext>
+    </p:extLst>
+  </p:cSld>
+  <p:clrMapOvr>
+    <a:masterClrMapping/>
+  </p:clrMapOvr>
+</p:sld>
+</file>
+
+<file path=ppt/slides/slide5.xml><?xml version="1.0" encoding="utf-8"?>
+<p:sld xmlns:a="http://schemas.openxmlformats.org/drawingml/2006/main" xmlns:r="http://schemas.openxmlformats.org/officeDocument/2006/relationships" xmlns:p="http://schemas.openxmlformats.org/presentationml/2006/main">
+  <p:cSld>
+    <p:spTree>
+      <p:nvGrpSpPr>
+        <p:cNvPr id="1" name=""/>
+        <p:cNvGrpSpPr/>
+        <p:nvPr/>
+      </p:nvGrpSpPr>
+      <p:grpSpPr>
+        <a:xfrm>
+          <a:off x="0" y="0"/>
+          <a:ext cx="0" cy="0"/>
+          <a:chOff x="0" y="0"/>
+          <a:chExt cx="0" cy="0"/>
+        </a:xfrm>
+      </p:grpSpPr>
+    </p:spTree>
+    <p:extLst>
+      <p:ext uri="{BB962C8B-B14F-4D97-AF65-F5344CB8AC3E}">
+        <p14:creationId xmlns:p14="http://schemas.microsoft.com/office/powerpoint/2010/main" val="2193469909"/>
       </p:ext>
     </p:extLst>
   </p:cSld>

</xml_diff>